<commit_message>
[ScheduList] Fix first lab
</commit_message>
<xml_diff>
--- a/Альмакеев_Романов_Касимов_ScheduList/Презентация проекта.pptx
+++ b/Альмакеев_Романов_Касимов_ScheduList/Презентация проекта.pptx
@@ -392,7 +392,7 @@
             <a:fld id="{5B106E36-FD25-4E2D-B0AA-010F637433A0}" type="datetimeFigureOut">
               <a:rPr lang="ru-RU" smtClean="0"/>
               <a:pPr/>
-              <a:t>03.10.2018</a:t>
+              <a:t>17.10.2018</a:t>
             </a:fld>
             <a:endParaRPr lang="ru-RU"/>
           </a:p>
@@ -787,7 +787,7 @@
             <a:fld id="{5B106E36-FD25-4E2D-B0AA-010F637433A0}" type="datetimeFigureOut">
               <a:rPr lang="ru-RU" smtClean="0"/>
               <a:pPr/>
-              <a:t>03.10.2018</a:t>
+              <a:t>17.10.2018</a:t>
             </a:fld>
             <a:endParaRPr lang="ru-RU"/>
           </a:p>
@@ -1322,7 +1322,7 @@
             <a:fld id="{5B106E36-FD25-4E2D-B0AA-010F637433A0}" type="datetimeFigureOut">
               <a:rPr lang="ru-RU" smtClean="0"/>
               <a:pPr/>
-              <a:t>03.10.2018</a:t>
+              <a:t>17.10.2018</a:t>
             </a:fld>
             <a:endParaRPr lang="ru-RU"/>
           </a:p>
@@ -1456,7 +1456,7 @@
             <a:fld id="{5B106E36-FD25-4E2D-B0AA-010F637433A0}" type="datetimeFigureOut">
               <a:rPr lang="ru-RU" smtClean="0"/>
               <a:pPr/>
-              <a:t>03.10.2018</a:t>
+              <a:t>17.10.2018</a:t>
             </a:fld>
             <a:endParaRPr lang="ru-RU"/>
           </a:p>
@@ -2001,7 +2001,7 @@
             <a:fld id="{5B106E36-FD25-4E2D-B0AA-010F637433A0}" type="datetimeFigureOut">
               <a:rPr lang="ru-RU" smtClean="0"/>
               <a:pPr/>
-              <a:t>03.10.2018</a:t>
+              <a:t>17.10.2018</a:t>
             </a:fld>
             <a:endParaRPr lang="ru-RU"/>
           </a:p>
@@ -2298,7 +2298,7 @@
             <a:fld id="{5B106E36-FD25-4E2D-B0AA-010F637433A0}" type="datetimeFigureOut">
               <a:rPr lang="ru-RU" smtClean="0"/>
               <a:pPr/>
-              <a:t>03.10.2018</a:t>
+              <a:t>17.10.2018</a:t>
             </a:fld>
             <a:endParaRPr lang="ru-RU"/>
           </a:p>
@@ -2959,7 +2959,7 @@
             <a:fld id="{5B106E36-FD25-4E2D-B0AA-010F637433A0}" type="datetimeFigureOut">
               <a:rPr lang="ru-RU" smtClean="0"/>
               <a:pPr/>
-              <a:t>03.10.2018</a:t>
+              <a:t>17.10.2018</a:t>
             </a:fld>
             <a:endParaRPr lang="ru-RU"/>
           </a:p>
@@ -3397,7 +3397,7 @@
             <a:fld id="{5B106E36-FD25-4E2D-B0AA-010F637433A0}" type="datetimeFigureOut">
               <a:rPr lang="ru-RU" smtClean="0"/>
               <a:pPr/>
-              <a:t>03.10.2018</a:t>
+              <a:t>17.10.2018</a:t>
             </a:fld>
             <a:endParaRPr lang="ru-RU"/>
           </a:p>
@@ -3712,7 +3712,7 @@
             <a:fld id="{5B106E36-FD25-4E2D-B0AA-010F637433A0}" type="datetimeFigureOut">
               <a:rPr lang="ru-RU" smtClean="0"/>
               <a:pPr/>
-              <a:t>03.10.2018</a:t>
+              <a:t>17.10.2018</a:t>
             </a:fld>
             <a:endParaRPr lang="ru-RU"/>
           </a:p>
@@ -4447,7 +4447,7 @@
             <a:fld id="{5B106E36-FD25-4E2D-B0AA-010F637433A0}" type="datetimeFigureOut">
               <a:rPr lang="ru-RU" smtClean="0"/>
               <a:pPr/>
-              <a:t>03.10.2018</a:t>
+              <a:t>17.10.2018</a:t>
             </a:fld>
             <a:endParaRPr lang="ru-RU"/>
           </a:p>
@@ -5113,7 +5113,7 @@
             <a:fld id="{5B106E36-FD25-4E2D-B0AA-010F637433A0}" type="datetimeFigureOut">
               <a:rPr lang="ru-RU" smtClean="0"/>
               <a:pPr/>
-              <a:t>03.10.2018</a:t>
+              <a:t>17.10.2018</a:t>
             </a:fld>
             <a:endParaRPr lang="ru-RU"/>
           </a:p>
@@ -5387,7 +5387,7 @@
             <a:fld id="{5B106E36-FD25-4E2D-B0AA-010F637433A0}" type="datetimeFigureOut">
               <a:rPr lang="ru-RU" smtClean="0"/>
               <a:pPr/>
-              <a:t>03.10.2018</a:t>
+              <a:t>17.10.2018</a:t>
             </a:fld>
             <a:endParaRPr lang="ru-RU"/>
           </a:p>
@@ -6071,11 +6071,36 @@
             <p:ph type="subTitle" idx="1"/>
           </p:nvPr>
         </p:nvSpPr>
-        <p:spPr/>
+        <p:spPr>
+          <a:xfrm>
+            <a:off x="3707904" y="5085184"/>
+            <a:ext cx="5144616" cy="1080120"/>
+          </a:xfrm>
+        </p:spPr>
         <p:txBody>
           <a:bodyPr/>
           <a:lstStyle/>
           <a:p>
+            <a:r>
+              <a:rPr lang="ru-RU" dirty="0" smtClean="0"/>
+              <a:t>Создатели: Альмакеев ф.И., Романов К.а., </a:t>
+            </a:r>
+            <a:r>
+              <a:rPr lang="ru-RU" dirty="0" err="1" smtClean="0"/>
+              <a:t>касимов</a:t>
+            </a:r>
+            <a:r>
+              <a:rPr lang="ru-RU" dirty="0" smtClean="0"/>
+              <a:t> </a:t>
+            </a:r>
+            <a:r>
+              <a:rPr lang="ru-RU" dirty="0" err="1" smtClean="0"/>
+              <a:t>а.м</a:t>
+            </a:r>
+            <a:r>
+              <a:rPr lang="ru-RU" dirty="0" smtClean="0"/>
+              <a:t>. </a:t>
+            </a:r>
             <a:endParaRPr lang="ru-RU" dirty="0"/>
           </a:p>
         </p:txBody>
@@ -6170,12 +6195,14 @@
         </p:nvSpPr>
         <p:spPr>
           <a:xfrm>
-            <a:off x="0" y="1484784"/>
-            <a:ext cx="5782416" cy="4686272"/>
-          </a:xfrm>
-        </p:spPr>
-        <p:txBody>
-          <a:bodyPr/>
+            <a:off x="179512" y="1484784"/>
+            <a:ext cx="5832648" cy="4686272"/>
+          </a:xfrm>
+        </p:spPr>
+        <p:txBody>
+          <a:bodyPr>
+            <a:normAutofit fontScale="92500" lnSpcReduction="20000"/>
+          </a:bodyPr>
           <a:lstStyle/>
           <a:p>
             <a:pPr>
@@ -6187,8 +6214,62 @@
             </a:r>
             <a:r>
               <a:rPr lang="ru-RU" dirty="0" smtClean="0"/>
-              <a:t>Многие студенты сталкиваются с проблемой рукописного расписания, например:</a:t>
-            </a:r>
+              <a:t>Проблемы со текущей формой расписания:</a:t>
+            </a:r>
+            <a:endParaRPr lang="ru-RU" dirty="0" smtClean="0"/>
+          </a:p>
+          <a:p>
+            <a:pPr marL="514350" indent="-514350">
+              <a:buAutoNum type="arabicPeriod"/>
+            </a:pPr>
+            <a:r>
+              <a:rPr lang="ru-RU" dirty="0" smtClean="0"/>
+              <a:t>Недоступность удалённого просмотра</a:t>
+            </a:r>
+          </a:p>
+          <a:p>
+            <a:pPr marL="514350" indent="-514350">
+              <a:buAutoNum type="arabicPeriod"/>
+            </a:pPr>
+            <a:r>
+              <a:rPr lang="ru-RU" dirty="0" smtClean="0"/>
+              <a:t>Трудности внесения изменений в расписание</a:t>
+            </a:r>
+          </a:p>
+          <a:p>
+            <a:pPr marL="514350" indent="-514350">
+              <a:buAutoNum type="arabicPeriod"/>
+            </a:pPr>
+            <a:r>
+              <a:rPr lang="ru-RU" dirty="0" smtClean="0"/>
+              <a:t>Неинформативное название предметов, сложные аббревиатуры </a:t>
+            </a:r>
+          </a:p>
+          <a:p>
+            <a:pPr marL="514350" indent="-514350">
+              <a:buAutoNum type="arabicPeriod"/>
+            </a:pPr>
+            <a:r>
+              <a:rPr lang="ru-RU" dirty="0" smtClean="0"/>
+              <a:t>Не указаны временные промежутки занятий</a:t>
+            </a:r>
+            <a:endParaRPr lang="ru-RU" dirty="0" smtClean="0"/>
+          </a:p>
+          <a:p>
+            <a:pPr marL="514350" indent="-514350">
+              <a:buAutoNum type="arabicPeriod"/>
+            </a:pPr>
+            <a:endParaRPr lang="ru-RU" dirty="0" smtClean="0"/>
+          </a:p>
+          <a:p>
+            <a:pPr marL="514350" indent="-514350" algn="r">
+              <a:buNone/>
+            </a:pPr>
+            <a:r>
+              <a:rPr lang="ru-RU" dirty="0" smtClean="0"/>
+              <a:t>Пример такого расписания:</a:t>
+            </a:r>
+            <a:endParaRPr lang="ru-RU" dirty="0" smtClean="0"/>
           </a:p>
         </p:txBody>
       </p:sp>
@@ -6298,7 +6379,19 @@
             </a:pPr>
             <a:r>
               <a:rPr lang="ru-RU" dirty="0" smtClean="0"/>
-              <a:t>	Проблема, описанная в предыдущем слайде, решается </a:t>
+              <a:t>	</a:t>
+            </a:r>
+            <a:r>
+              <a:rPr lang="ru-RU" dirty="0" smtClean="0"/>
+              <a:t>Проблемы, описанные </a:t>
+            </a:r>
+            <a:r>
+              <a:rPr lang="ru-RU" dirty="0" smtClean="0"/>
+              <a:t>в предыдущем слайде, </a:t>
+            </a:r>
+            <a:r>
+              <a:rPr lang="ru-RU" dirty="0" smtClean="0"/>
+              <a:t>решаются </a:t>
             </a:r>
             <a:r>
               <a:rPr lang="ru-RU" dirty="0" err="1" smtClean="0"/>
@@ -6512,82 +6605,31 @@
             <p:ph type="title"/>
           </p:nvPr>
         </p:nvSpPr>
-        <p:spPr/>
-        <p:txBody>
-          <a:bodyPr/>
-          <a:lstStyle/>
-          <a:p>
-            <a:r>
-              <a:rPr lang="ru-RU" dirty="0" smtClean="0"/>
-              <a:t>Команда проекта</a:t>
-            </a:r>
-            <a:endParaRPr lang="ru-RU" dirty="0"/>
-          </a:p>
-        </p:txBody>
-      </p:sp>
-      <p:sp>
-        <p:nvSpPr>
-          <p:cNvPr id="3" name="Содержимое 2"/>
-          <p:cNvSpPr>
-            <a:spLocks noGrp="1"/>
-          </p:cNvSpPr>
-          <p:nvPr>
-            <p:ph sz="quarter" idx="1"/>
-          </p:nvPr>
-        </p:nvSpPr>
         <p:spPr>
           <a:xfrm>
-            <a:off x="251520" y="1916832"/>
-            <a:ext cx="8503920" cy="4572000"/>
+            <a:off x="323528" y="2420888"/>
+            <a:ext cx="8534400" cy="758952"/>
           </a:xfrm>
         </p:spPr>
         <p:txBody>
           <a:bodyPr>
-            <a:normAutofit/>
+            <a:noAutofit/>
           </a:bodyPr>
           <a:lstStyle/>
           <a:p>
-            <a:pPr lvl="1">
-              <a:buFont typeface="Wingdings" pitchFamily="2" charset="2"/>
-              <a:buChar char="Ø"/>
-            </a:pPr>
-            <a:r>
-              <a:rPr lang="ru-RU" sz="2500" dirty="0" smtClean="0"/>
-              <a:t>Руководитель проекта – Филипп Альмакеев</a:t>
-            </a:r>
-          </a:p>
-          <a:p>
-            <a:pPr lvl="1">
-              <a:buFont typeface="Wingdings" pitchFamily="2" charset="2"/>
-              <a:buChar char="Ø"/>
-            </a:pPr>
-            <a:r>
-              <a:rPr lang="ru-RU" sz="2500" dirty="0" smtClean="0"/>
-              <a:t>Главный разработчик – Кирилл Романов</a:t>
-            </a:r>
-          </a:p>
-          <a:p>
-            <a:pPr lvl="1">
-              <a:buFont typeface="Wingdings" pitchFamily="2" charset="2"/>
-              <a:buChar char="Ø"/>
-            </a:pPr>
-            <a:r>
-              <a:rPr lang="ru-RU" sz="2500" dirty="0" smtClean="0"/>
-              <a:t>Менеджер проекта – </a:t>
-            </a:r>
-            <a:r>
-              <a:rPr lang="ru-RU" sz="2500" dirty="0" err="1" smtClean="0"/>
-              <a:t>Азат</a:t>
-            </a:r>
-            <a:r>
-              <a:rPr lang="ru-RU" sz="2500" dirty="0" smtClean="0"/>
-              <a:t> </a:t>
-            </a:r>
-            <a:r>
-              <a:rPr lang="ru-RU" sz="2500" dirty="0" err="1" smtClean="0"/>
-              <a:t>Касимов</a:t>
-            </a:r>
-            <a:endParaRPr lang="ru-RU" sz="2500" dirty="0"/>
+            <a:r>
+              <a:rPr lang="ru-RU" sz="4800" dirty="0" smtClean="0">
+                <a:solidFill>
+                  <a:srgbClr val="D16349"/>
+                </a:solidFill>
+              </a:rPr>
+              <a:t>Спасибо за внимание.</a:t>
+            </a:r>
+            <a:endParaRPr lang="ru-RU" sz="4800" dirty="0">
+              <a:solidFill>
+                <a:srgbClr val="D16349"/>
+              </a:solidFill>
+            </a:endParaRPr>
           </a:p>
         </p:txBody>
       </p:sp>

</xml_diff>